<commit_message>
fixed some types in the presenation
</commit_message>
<xml_diff>
--- a/OperatingSystems-C-SecondYear/lesson-11-sockets/Introduction-to-Sockets-in-C.pptx
+++ b/OperatingSystems-C-SecondYear/lesson-11-sockets/Introduction-to-Sockets-in-C.pptx
@@ -17707,8 +17707,8 @@
         </p:nvSpPr>
         <p:spPr>
           <a:xfrm>
-            <a:off x="797838" y="1639253"/>
-            <a:ext cx="7548324" cy="5972175"/>
+            <a:off x="44038" y="3043448"/>
+            <a:ext cx="6975590" cy="4567979"/>
           </a:xfrm>
           <a:prstGeom prst="roundRect">
             <a:avLst>
@@ -17734,8 +17734,8 @@
         </p:nvSpPr>
         <p:spPr>
           <a:xfrm>
-            <a:off x="805458" y="1646873"/>
-            <a:ext cx="7533084" cy="653415"/>
+            <a:off x="51227" y="1787844"/>
+            <a:ext cx="6996525" cy="512444"/>
           </a:xfrm>
           <a:prstGeom prst="rect">
             <a:avLst/>
@@ -17756,8 +17756,8 @@
         </p:nvSpPr>
         <p:spPr>
           <a:xfrm>
-            <a:off x="1033343" y="1791176"/>
-            <a:ext cx="3306961" cy="364808"/>
+            <a:off x="159558" y="1869880"/>
+            <a:ext cx="3213409" cy="286103"/>
           </a:xfrm>
           <a:prstGeom prst="rect">
             <a:avLst/>
@@ -17786,6 +17786,28 @@
               </a:rPr>
               <a:t>System Call</a:t>
             </a:r>
+            <a:r>
+              <a:rPr lang="he-IL" sz="1750" b="1" dirty="0">
+                <a:solidFill>
+                  <a:srgbClr val="D6E5EF"/>
+                </a:solidFill>
+                <a:latin typeface="Source Sans Pro" pitchFamily="34" charset="0"/>
+                <a:ea typeface="Source Sans Pro" pitchFamily="34" charset="-122"/>
+                <a:cs typeface="Source Sans Pro" pitchFamily="34" charset="-120"/>
+              </a:rPr>
+              <a:t> </a:t>
+            </a:r>
+            <a:r>
+              <a:rPr lang="en-US" sz="1750" b="1" dirty="0">
+                <a:solidFill>
+                  <a:srgbClr val="D6E5EF"/>
+                </a:solidFill>
+                <a:latin typeface="Source Sans Pro" pitchFamily="34" charset="0"/>
+                <a:ea typeface="Source Sans Pro" pitchFamily="34" charset="-122"/>
+                <a:cs typeface="Source Sans Pro" pitchFamily="34" charset="-120"/>
+              </a:rPr>
+              <a:t> - Server</a:t>
+            </a:r>
             <a:endParaRPr lang="en-US" sz="1750" dirty="0"/>
           </a:p>
         </p:txBody>
@@ -17798,8 +17820,8 @@
         </p:nvSpPr>
         <p:spPr>
           <a:xfrm>
-            <a:off x="4803696" y="1791176"/>
-            <a:ext cx="3306961" cy="364808"/>
+            <a:off x="3929912" y="1875240"/>
+            <a:ext cx="3117840" cy="280743"/>
           </a:xfrm>
           <a:prstGeom prst="rect">
             <a:avLst/>
@@ -17840,8 +17862,8 @@
         </p:nvSpPr>
         <p:spPr>
           <a:xfrm>
-            <a:off x="805458" y="2300288"/>
-            <a:ext cx="7533084" cy="653415"/>
+            <a:off x="51227" y="2441259"/>
+            <a:ext cx="6996525" cy="512444"/>
           </a:xfrm>
           <a:prstGeom prst="rect">
             <a:avLst/>
@@ -17862,8 +17884,8 @@
         </p:nvSpPr>
         <p:spPr>
           <a:xfrm>
-            <a:off x="1033343" y="2444591"/>
-            <a:ext cx="3306961" cy="364808"/>
+            <a:off x="159558" y="2523295"/>
+            <a:ext cx="3213409" cy="286103"/>
           </a:xfrm>
           <a:prstGeom prst="rect">
             <a:avLst/>
@@ -17904,8 +17926,8 @@
         </p:nvSpPr>
         <p:spPr>
           <a:xfrm>
-            <a:off x="4803696" y="2444591"/>
-            <a:ext cx="3306961" cy="364808"/>
+            <a:off x="3929912" y="2528655"/>
+            <a:ext cx="3117840" cy="280743"/>
           </a:xfrm>
           <a:prstGeom prst="rect">
             <a:avLst/>
@@ -17946,8 +17968,8 @@
         </p:nvSpPr>
         <p:spPr>
           <a:xfrm>
-            <a:off x="805458" y="2953702"/>
-            <a:ext cx="7533084" cy="653415"/>
+            <a:off x="51227" y="3094673"/>
+            <a:ext cx="6996525" cy="512444"/>
           </a:xfrm>
           <a:prstGeom prst="rect">
             <a:avLst/>
@@ -17968,8 +17990,8 @@
         </p:nvSpPr>
         <p:spPr>
           <a:xfrm>
-            <a:off x="1033343" y="3098006"/>
-            <a:ext cx="3306961" cy="364808"/>
+            <a:off x="159558" y="3176710"/>
+            <a:ext cx="3213409" cy="286103"/>
           </a:xfrm>
           <a:prstGeom prst="rect">
             <a:avLst/>
@@ -18010,8 +18032,8 @@
         </p:nvSpPr>
         <p:spPr>
           <a:xfrm>
-            <a:off x="4803696" y="3098006"/>
-            <a:ext cx="3306961" cy="364808"/>
+            <a:off x="3929912" y="3182070"/>
+            <a:ext cx="3117840" cy="280743"/>
           </a:xfrm>
           <a:prstGeom prst="rect">
             <a:avLst/>
@@ -18052,8 +18074,8 @@
         </p:nvSpPr>
         <p:spPr>
           <a:xfrm>
-            <a:off x="805458" y="3607118"/>
-            <a:ext cx="7533084" cy="1018223"/>
+            <a:off x="51227" y="3826794"/>
+            <a:ext cx="6996524" cy="798547"/>
           </a:xfrm>
           <a:prstGeom prst="rect">
             <a:avLst/>
@@ -18074,8 +18096,8 @@
         </p:nvSpPr>
         <p:spPr>
           <a:xfrm>
-            <a:off x="1033343" y="3751421"/>
-            <a:ext cx="3306961" cy="364808"/>
+            <a:off x="159558" y="3830125"/>
+            <a:ext cx="3213409" cy="286103"/>
           </a:xfrm>
           <a:prstGeom prst="rect">
             <a:avLst/>
@@ -18116,8 +18138,8 @@
         </p:nvSpPr>
         <p:spPr>
           <a:xfrm>
-            <a:off x="4803696" y="3751421"/>
-            <a:ext cx="3306961" cy="729615"/>
+            <a:off x="3929912" y="3919552"/>
+            <a:ext cx="3117840" cy="561484"/>
           </a:xfrm>
           <a:prstGeom prst="rect">
             <a:avLst/>
@@ -18158,8 +18180,8 @@
         </p:nvSpPr>
         <p:spPr>
           <a:xfrm>
-            <a:off x="805458" y="4625340"/>
-            <a:ext cx="7533084" cy="653415"/>
+            <a:off x="51227" y="4766311"/>
+            <a:ext cx="6996524" cy="512444"/>
           </a:xfrm>
           <a:prstGeom prst="rect">
             <a:avLst/>
@@ -18180,8 +18202,8 @@
         </p:nvSpPr>
         <p:spPr>
           <a:xfrm>
-            <a:off x="1033343" y="4769644"/>
-            <a:ext cx="3306961" cy="364808"/>
+            <a:off x="159558" y="4848348"/>
+            <a:ext cx="3213409" cy="286103"/>
           </a:xfrm>
           <a:prstGeom prst="rect">
             <a:avLst/>
@@ -18222,8 +18244,8 @@
         </p:nvSpPr>
         <p:spPr>
           <a:xfrm>
-            <a:off x="4803696" y="4769644"/>
-            <a:ext cx="3306961" cy="364808"/>
+            <a:off x="3929912" y="4853708"/>
+            <a:ext cx="3117840" cy="280743"/>
           </a:xfrm>
           <a:prstGeom prst="rect">
             <a:avLst/>
@@ -18264,8 +18286,8 @@
         </p:nvSpPr>
         <p:spPr>
           <a:xfrm>
-            <a:off x="805458" y="5278755"/>
-            <a:ext cx="7533084" cy="1018223"/>
+            <a:off x="51227" y="5498431"/>
+            <a:ext cx="6996524" cy="798547"/>
           </a:xfrm>
           <a:prstGeom prst="rect">
             <a:avLst/>
@@ -18286,8 +18308,8 @@
         </p:nvSpPr>
         <p:spPr>
           <a:xfrm>
-            <a:off x="1033343" y="5423059"/>
-            <a:ext cx="3306961" cy="364808"/>
+            <a:off x="159558" y="5501763"/>
+            <a:ext cx="3213409" cy="286103"/>
           </a:xfrm>
           <a:prstGeom prst="rect">
             <a:avLst/>
@@ -18305,17 +18327,6 @@
               </a:lnSpc>
               <a:buNone/>
             </a:pPr>
-            <a:r>
-              <a:rPr lang="en-US" sz="1750" dirty="0">
-                <a:solidFill>
-                  <a:srgbClr val="D6E5EF"/>
-                </a:solidFill>
-                <a:latin typeface="Source Sans Pro" pitchFamily="34" charset="0"/>
-                <a:ea typeface="Source Sans Pro" pitchFamily="34" charset="-122"/>
-                <a:cs typeface="Source Sans Pro" pitchFamily="34" charset="-120"/>
-              </a:rPr>
-              <a:t>connect()</a:t>
-            </a:r>
             <a:endParaRPr lang="en-US" sz="1750" dirty="0"/>
           </a:p>
         </p:txBody>
@@ -18328,8 +18339,8 @@
         </p:nvSpPr>
         <p:spPr>
           <a:xfrm>
-            <a:off x="4803696" y="5423059"/>
-            <a:ext cx="3306961" cy="729615"/>
+            <a:off x="3929912" y="5591190"/>
+            <a:ext cx="3117840" cy="561484"/>
           </a:xfrm>
           <a:prstGeom prst="rect">
             <a:avLst/>
@@ -18347,17 +18358,6 @@
               </a:lnSpc>
               <a:buNone/>
             </a:pPr>
-            <a:r>
-              <a:rPr lang="en-US" sz="1750" dirty="0">
-                <a:solidFill>
-                  <a:schemeClr val="bg2"/>
-                </a:solidFill>
-                <a:latin typeface="Source Sans Pro" pitchFamily="34" charset="0"/>
-                <a:ea typeface="Source Sans Pro" pitchFamily="34" charset="-122"/>
-                <a:cs typeface="Source Sans Pro" pitchFamily="34" charset="-120"/>
-              </a:rPr>
-              <a:t>Establishes a connection to a server</a:t>
-            </a:r>
             <a:endParaRPr lang="en-US" sz="1750" dirty="0">
               <a:solidFill>
                 <a:schemeClr val="bg2"/>
@@ -18374,8 +18374,8 @@
         </p:nvSpPr>
         <p:spPr>
           <a:xfrm>
-            <a:off x="813078" y="6312218"/>
-            <a:ext cx="7533084" cy="653415"/>
+            <a:off x="36417" y="5552019"/>
+            <a:ext cx="6981284" cy="512444"/>
           </a:xfrm>
           <a:prstGeom prst="rect">
             <a:avLst/>
@@ -18396,8 +18396,8 @@
         </p:nvSpPr>
         <p:spPr>
           <a:xfrm>
-            <a:off x="1033343" y="6441281"/>
-            <a:ext cx="3306961" cy="364808"/>
+            <a:off x="159558" y="5619757"/>
+            <a:ext cx="3213409" cy="286103"/>
           </a:xfrm>
           <a:prstGeom prst="rect">
             <a:avLst/>
@@ -18438,8 +18438,8 @@
         </p:nvSpPr>
         <p:spPr>
           <a:xfrm>
-            <a:off x="4803696" y="6441281"/>
-            <a:ext cx="3306961" cy="364808"/>
+            <a:off x="3899861" y="5595122"/>
+            <a:ext cx="3117840" cy="280743"/>
           </a:xfrm>
           <a:prstGeom prst="rect">
             <a:avLst/>
@@ -18460,7 +18460,7 @@
             <a:r>
               <a:rPr lang="en-US" sz="1750" dirty="0">
                 <a:solidFill>
-                  <a:schemeClr val="bg2"/>
+                  <a:srgbClr val="D6E5EF"/>
                 </a:solidFill>
                 <a:latin typeface="Source Sans Pro" panose="020B0503030403020204" pitchFamily="34" charset="0"/>
                 <a:ea typeface="Source Sans Pro" panose="020B0503030403020204" pitchFamily="34" charset="0"/>
@@ -18478,8 +18478,8 @@
         </p:nvSpPr>
         <p:spPr>
           <a:xfrm>
-            <a:off x="1033343" y="7094696"/>
-            <a:ext cx="3306961" cy="364808"/>
+            <a:off x="159558" y="7173400"/>
+            <a:ext cx="3213409" cy="286103"/>
           </a:xfrm>
           <a:prstGeom prst="rect">
             <a:avLst/>
@@ -18509,8 +18509,8 @@
         </p:nvSpPr>
         <p:spPr>
           <a:xfrm>
-            <a:off x="4875615" y="7125984"/>
-            <a:ext cx="3306961" cy="364808"/>
+            <a:off x="4001830" y="7204688"/>
+            <a:ext cx="3213409" cy="286103"/>
           </a:xfrm>
           <a:prstGeom prst="rect">
             <a:avLst/>
@@ -18529,6 +18529,1044 @@
               <a:buNone/>
             </a:pPr>
             <a:endParaRPr lang="en-US" sz="1750" dirty="0"/>
+          </a:p>
+        </p:txBody>
+      </p:sp>
+      <p:sp>
+        <p:nvSpPr>
+          <p:cNvPr id="2" name="Shape 1">
+            <a:extLst>
+              <a:ext uri="{FF2B5EF4-FFF2-40B4-BE49-F238E27FC236}">
+                <a16:creationId xmlns:a16="http://schemas.microsoft.com/office/drawing/2014/main" id="{86F7E3D8-FAEE-2721-793B-ECBEB836BAAF}"/>
+              </a:ext>
+            </a:extLst>
+          </p:cNvPr>
+          <p:cNvSpPr/>
+          <p:nvPr/>
+        </p:nvSpPr>
+        <p:spPr>
+          <a:xfrm>
+            <a:off x="7168436" y="3041740"/>
+            <a:ext cx="7319978" cy="4567978"/>
+          </a:xfrm>
+          <a:prstGeom prst="roundRect">
+            <a:avLst>
+              <a:gd name="adj" fmla="val 573"/>
+            </a:avLst>
+          </a:prstGeom>
+          <a:noFill/>
+          <a:ln w="7620">
+            <a:solidFill>
+              <a:srgbClr val="FFFFFF">
+                <a:alpha val="24000"/>
+              </a:srgbClr>
+            </a:solidFill>
+            <a:prstDash val="solid"/>
+          </a:ln>
+        </p:spPr>
+      </p:sp>
+      <p:sp>
+        <p:nvSpPr>
+          <p:cNvPr id="26" name="Shape 2">
+            <a:extLst>
+              <a:ext uri="{FF2B5EF4-FFF2-40B4-BE49-F238E27FC236}">
+                <a16:creationId xmlns:a16="http://schemas.microsoft.com/office/drawing/2014/main" id="{262B4E1B-41EE-6C40-2BB7-2095F26B1D6C}"/>
+              </a:ext>
+            </a:extLst>
+          </p:cNvPr>
+          <p:cNvSpPr/>
+          <p:nvPr/>
+        </p:nvSpPr>
+        <p:spPr>
+          <a:xfrm>
+            <a:off x="7175594" y="1798796"/>
+            <a:ext cx="7305199" cy="499782"/>
+          </a:xfrm>
+          <a:prstGeom prst="rect">
+            <a:avLst/>
+          </a:prstGeom>
+          <a:solidFill>
+            <a:srgbClr val="FFFFFF">
+              <a:alpha val="4000"/>
+            </a:srgbClr>
+          </a:solidFill>
+          <a:ln/>
+        </p:spPr>
+      </p:sp>
+      <p:sp>
+        <p:nvSpPr>
+          <p:cNvPr id="29" name="Text 3">
+            <a:extLst>
+              <a:ext uri="{FF2B5EF4-FFF2-40B4-BE49-F238E27FC236}">
+                <a16:creationId xmlns:a16="http://schemas.microsoft.com/office/drawing/2014/main" id="{4B17DC58-0038-9F2D-899B-E6B69374F5C6}"/>
+              </a:ext>
+            </a:extLst>
+          </p:cNvPr>
+          <p:cNvSpPr/>
+          <p:nvPr/>
+        </p:nvSpPr>
+        <p:spPr>
+          <a:xfrm>
+            <a:off x="7275635" y="1875240"/>
+            <a:ext cx="3206921" cy="279033"/>
+          </a:xfrm>
+          <a:prstGeom prst="rect">
+            <a:avLst/>
+          </a:prstGeom>
+          <a:noFill/>
+          <a:ln/>
+        </p:spPr>
+        <p:txBody>
+          <a:bodyPr wrap="none" lIns="0" tIns="0" rIns="0" bIns="0" rtlCol="0" anchor="t"/>
+          <a:lstStyle/>
+          <a:p>
+            <a:pPr marL="0" indent="0">
+              <a:lnSpc>
+                <a:spcPts val="2850"/>
+              </a:lnSpc>
+              <a:buNone/>
+            </a:pPr>
+            <a:r>
+              <a:rPr lang="en-US" sz="1750" b="1" dirty="0">
+                <a:solidFill>
+                  <a:srgbClr val="D6E5EF"/>
+                </a:solidFill>
+                <a:latin typeface="Source Sans Pro" pitchFamily="34" charset="0"/>
+                <a:ea typeface="Source Sans Pro" pitchFamily="34" charset="-122"/>
+                <a:cs typeface="Source Sans Pro" pitchFamily="34" charset="-120"/>
+              </a:rPr>
+              <a:t>System Call - Client</a:t>
+            </a:r>
+            <a:endParaRPr lang="en-US" sz="1750" dirty="0"/>
+          </a:p>
+        </p:txBody>
+      </p:sp>
+      <p:sp>
+        <p:nvSpPr>
+          <p:cNvPr id="30" name="Text 4">
+            <a:extLst>
+              <a:ext uri="{FF2B5EF4-FFF2-40B4-BE49-F238E27FC236}">
+                <a16:creationId xmlns:a16="http://schemas.microsoft.com/office/drawing/2014/main" id="{3BD873BE-3776-C8A3-15B7-907AFF5326E3}"/>
+              </a:ext>
+            </a:extLst>
+          </p:cNvPr>
+          <p:cNvSpPr/>
+          <p:nvPr/>
+        </p:nvSpPr>
+        <p:spPr>
+          <a:xfrm>
+            <a:off x="11045988" y="1875240"/>
+            <a:ext cx="3206921" cy="279033"/>
+          </a:xfrm>
+          <a:prstGeom prst="rect">
+            <a:avLst/>
+          </a:prstGeom>
+          <a:noFill/>
+          <a:ln/>
+        </p:spPr>
+        <p:txBody>
+          <a:bodyPr wrap="none" lIns="0" tIns="0" rIns="0" bIns="0" rtlCol="0" anchor="t"/>
+          <a:lstStyle/>
+          <a:p>
+            <a:pPr marL="0" indent="0">
+              <a:lnSpc>
+                <a:spcPts val="2850"/>
+              </a:lnSpc>
+              <a:buNone/>
+            </a:pPr>
+            <a:r>
+              <a:rPr lang="en-US" sz="1750" b="1" dirty="0">
+                <a:solidFill>
+                  <a:srgbClr val="D6E5EF"/>
+                </a:solidFill>
+                <a:latin typeface="Source Sans Pro" pitchFamily="34" charset="0"/>
+                <a:ea typeface="Source Sans Pro" pitchFamily="34" charset="-122"/>
+                <a:cs typeface="Source Sans Pro" pitchFamily="34" charset="-120"/>
+              </a:rPr>
+              <a:t>Description</a:t>
+            </a:r>
+            <a:endParaRPr lang="en-US" sz="1750" dirty="0"/>
+          </a:p>
+        </p:txBody>
+      </p:sp>
+      <p:sp>
+        <p:nvSpPr>
+          <p:cNvPr id="31" name="Shape 5">
+            <a:extLst>
+              <a:ext uri="{FF2B5EF4-FFF2-40B4-BE49-F238E27FC236}">
+                <a16:creationId xmlns:a16="http://schemas.microsoft.com/office/drawing/2014/main" id="{07418556-EE10-964E-8D33-9C156395A89F}"/>
+              </a:ext>
+            </a:extLst>
+          </p:cNvPr>
+          <p:cNvSpPr/>
+          <p:nvPr/>
+        </p:nvSpPr>
+        <p:spPr>
+          <a:xfrm>
+            <a:off x="7175594" y="2452211"/>
+            <a:ext cx="7305199" cy="499782"/>
+          </a:xfrm>
+          <a:prstGeom prst="rect">
+            <a:avLst/>
+          </a:prstGeom>
+          <a:solidFill>
+            <a:srgbClr val="000000">
+              <a:alpha val="4000"/>
+            </a:srgbClr>
+          </a:solidFill>
+          <a:ln/>
+        </p:spPr>
+      </p:sp>
+      <p:sp>
+        <p:nvSpPr>
+          <p:cNvPr id="32" name="Text 6">
+            <a:extLst>
+              <a:ext uri="{FF2B5EF4-FFF2-40B4-BE49-F238E27FC236}">
+                <a16:creationId xmlns:a16="http://schemas.microsoft.com/office/drawing/2014/main" id="{817EDED7-DA09-8E34-E023-A9D1CFB59308}"/>
+              </a:ext>
+            </a:extLst>
+          </p:cNvPr>
+          <p:cNvSpPr/>
+          <p:nvPr/>
+        </p:nvSpPr>
+        <p:spPr>
+          <a:xfrm>
+            <a:off x="7275635" y="2528655"/>
+            <a:ext cx="3206921" cy="279033"/>
+          </a:xfrm>
+          <a:prstGeom prst="rect">
+            <a:avLst/>
+          </a:prstGeom>
+          <a:noFill/>
+          <a:ln/>
+        </p:spPr>
+        <p:txBody>
+          <a:bodyPr wrap="none" lIns="0" tIns="0" rIns="0" bIns="0" rtlCol="0" anchor="t"/>
+          <a:lstStyle/>
+          <a:p>
+            <a:pPr marL="0" indent="0">
+              <a:lnSpc>
+                <a:spcPts val="2850"/>
+              </a:lnSpc>
+              <a:buNone/>
+            </a:pPr>
+            <a:r>
+              <a:rPr lang="en-US" sz="1750" dirty="0">
+                <a:solidFill>
+                  <a:srgbClr val="D6E5EF"/>
+                </a:solidFill>
+                <a:latin typeface="Source Sans Pro" pitchFamily="34" charset="0"/>
+                <a:ea typeface="Source Sans Pro" pitchFamily="34" charset="-122"/>
+                <a:cs typeface="Source Sans Pro" pitchFamily="34" charset="-120"/>
+              </a:rPr>
+              <a:t>socket()</a:t>
+            </a:r>
+            <a:endParaRPr lang="en-US" sz="1750" dirty="0"/>
+          </a:p>
+        </p:txBody>
+      </p:sp>
+      <p:sp>
+        <p:nvSpPr>
+          <p:cNvPr id="33" name="Text 7">
+            <a:extLst>
+              <a:ext uri="{FF2B5EF4-FFF2-40B4-BE49-F238E27FC236}">
+                <a16:creationId xmlns:a16="http://schemas.microsoft.com/office/drawing/2014/main" id="{64CF8D16-7BF1-4F9A-6DB8-C6276E442C9A}"/>
+              </a:ext>
+            </a:extLst>
+          </p:cNvPr>
+          <p:cNvSpPr/>
+          <p:nvPr/>
+        </p:nvSpPr>
+        <p:spPr>
+          <a:xfrm>
+            <a:off x="11045988" y="2528655"/>
+            <a:ext cx="3206921" cy="279033"/>
+          </a:xfrm>
+          <a:prstGeom prst="rect">
+            <a:avLst/>
+          </a:prstGeom>
+          <a:noFill/>
+          <a:ln/>
+        </p:spPr>
+        <p:txBody>
+          <a:bodyPr wrap="none" lIns="0" tIns="0" rIns="0" bIns="0" rtlCol="0" anchor="t"/>
+          <a:lstStyle/>
+          <a:p>
+            <a:pPr marL="0" indent="0">
+              <a:lnSpc>
+                <a:spcPts val="2850"/>
+              </a:lnSpc>
+              <a:buNone/>
+            </a:pPr>
+            <a:r>
+              <a:rPr lang="en-US" sz="1750" dirty="0">
+                <a:solidFill>
+                  <a:srgbClr val="D6E5EF"/>
+                </a:solidFill>
+                <a:latin typeface="Source Sans Pro" pitchFamily="34" charset="0"/>
+                <a:ea typeface="Source Sans Pro" pitchFamily="34" charset="-122"/>
+                <a:cs typeface="Source Sans Pro" pitchFamily="34" charset="-120"/>
+              </a:rPr>
+              <a:t>Creates a new socket</a:t>
+            </a:r>
+            <a:endParaRPr lang="en-US" sz="1750" dirty="0"/>
+          </a:p>
+        </p:txBody>
+      </p:sp>
+      <p:sp>
+        <p:nvSpPr>
+          <p:cNvPr id="34" name="Shape 8">
+            <a:extLst>
+              <a:ext uri="{FF2B5EF4-FFF2-40B4-BE49-F238E27FC236}">
+                <a16:creationId xmlns:a16="http://schemas.microsoft.com/office/drawing/2014/main" id="{8439F887-15A3-EE47-6A0C-F41E14D356D9}"/>
+              </a:ext>
+            </a:extLst>
+          </p:cNvPr>
+          <p:cNvSpPr/>
+          <p:nvPr/>
+        </p:nvSpPr>
+        <p:spPr>
+          <a:xfrm>
+            <a:off x="7175594" y="3105625"/>
+            <a:ext cx="7305199" cy="677986"/>
+          </a:xfrm>
+          <a:prstGeom prst="rect">
+            <a:avLst/>
+          </a:prstGeom>
+          <a:solidFill>
+            <a:srgbClr val="FFFFFF">
+              <a:alpha val="4000"/>
+            </a:srgbClr>
+          </a:solidFill>
+          <a:ln/>
+        </p:spPr>
+      </p:sp>
+      <p:sp>
+        <p:nvSpPr>
+          <p:cNvPr id="35" name="Text 9">
+            <a:extLst>
+              <a:ext uri="{FF2B5EF4-FFF2-40B4-BE49-F238E27FC236}">
+                <a16:creationId xmlns:a16="http://schemas.microsoft.com/office/drawing/2014/main" id="{CE108C2B-804F-27D2-1A2C-FDB7A06EDDFA}"/>
+              </a:ext>
+            </a:extLst>
+          </p:cNvPr>
+          <p:cNvSpPr/>
+          <p:nvPr/>
+        </p:nvSpPr>
+        <p:spPr>
+          <a:xfrm>
+            <a:off x="7275635" y="3182070"/>
+            <a:ext cx="3206921" cy="279033"/>
+          </a:xfrm>
+          <a:prstGeom prst="rect">
+            <a:avLst/>
+          </a:prstGeom>
+          <a:noFill/>
+          <a:ln/>
+        </p:spPr>
+        <p:txBody>
+          <a:bodyPr wrap="none" lIns="0" tIns="0" rIns="0" bIns="0" rtlCol="0" anchor="t"/>
+          <a:lstStyle/>
+          <a:p>
+            <a:pPr marL="0" indent="0">
+              <a:lnSpc>
+                <a:spcPts val="2850"/>
+              </a:lnSpc>
+              <a:buNone/>
+            </a:pPr>
+            <a:endParaRPr lang="en-US" sz="1750" dirty="0"/>
+          </a:p>
+        </p:txBody>
+      </p:sp>
+      <p:sp>
+        <p:nvSpPr>
+          <p:cNvPr id="36" name="Text 10">
+            <a:extLst>
+              <a:ext uri="{FF2B5EF4-FFF2-40B4-BE49-F238E27FC236}">
+                <a16:creationId xmlns:a16="http://schemas.microsoft.com/office/drawing/2014/main" id="{5F0984C5-7FF6-1E6A-0D5E-25A98FC6D1C9}"/>
+              </a:ext>
+            </a:extLst>
+          </p:cNvPr>
+          <p:cNvSpPr/>
+          <p:nvPr/>
+        </p:nvSpPr>
+        <p:spPr>
+          <a:xfrm>
+            <a:off x="11045988" y="3182070"/>
+            <a:ext cx="3206921" cy="279033"/>
+          </a:xfrm>
+          <a:prstGeom prst="rect">
+            <a:avLst/>
+          </a:prstGeom>
+          <a:noFill/>
+          <a:ln/>
+        </p:spPr>
+        <p:txBody>
+          <a:bodyPr wrap="none" lIns="0" tIns="0" rIns="0" bIns="0" rtlCol="0" anchor="t"/>
+          <a:lstStyle/>
+          <a:p>
+            <a:pPr marL="0" indent="0">
+              <a:lnSpc>
+                <a:spcPts val="2850"/>
+              </a:lnSpc>
+              <a:buNone/>
+            </a:pPr>
+            <a:endParaRPr lang="en-US" sz="1750" dirty="0"/>
+          </a:p>
+        </p:txBody>
+      </p:sp>
+      <p:sp>
+        <p:nvSpPr>
+          <p:cNvPr id="37" name="Shape 11">
+            <a:extLst>
+              <a:ext uri="{FF2B5EF4-FFF2-40B4-BE49-F238E27FC236}">
+                <a16:creationId xmlns:a16="http://schemas.microsoft.com/office/drawing/2014/main" id="{7EC3EFCF-4819-956D-1654-9E7887EB28A7}"/>
+              </a:ext>
+            </a:extLst>
+          </p:cNvPr>
+          <p:cNvSpPr/>
+          <p:nvPr/>
+        </p:nvSpPr>
+        <p:spPr>
+          <a:xfrm>
+            <a:off x="7175594" y="3844816"/>
+            <a:ext cx="7305199" cy="778815"/>
+          </a:xfrm>
+          <a:prstGeom prst="rect">
+            <a:avLst/>
+          </a:prstGeom>
+          <a:solidFill>
+            <a:srgbClr val="000000">
+              <a:alpha val="4000"/>
+            </a:srgbClr>
+          </a:solidFill>
+          <a:ln/>
+        </p:spPr>
+      </p:sp>
+      <p:sp>
+        <p:nvSpPr>
+          <p:cNvPr id="38" name="Text 12">
+            <a:extLst>
+              <a:ext uri="{FF2B5EF4-FFF2-40B4-BE49-F238E27FC236}">
+                <a16:creationId xmlns:a16="http://schemas.microsoft.com/office/drawing/2014/main" id="{228E8191-1158-C0FF-84FF-DB117D04287A}"/>
+              </a:ext>
+            </a:extLst>
+          </p:cNvPr>
+          <p:cNvSpPr/>
+          <p:nvPr/>
+        </p:nvSpPr>
+        <p:spPr>
+          <a:xfrm>
+            <a:off x="7275635" y="3835485"/>
+            <a:ext cx="3206921" cy="279033"/>
+          </a:xfrm>
+          <a:prstGeom prst="rect">
+            <a:avLst/>
+          </a:prstGeom>
+          <a:noFill/>
+          <a:ln/>
+        </p:spPr>
+        <p:txBody>
+          <a:bodyPr wrap="none" lIns="0" tIns="0" rIns="0" bIns="0" rtlCol="0" anchor="t"/>
+          <a:lstStyle/>
+          <a:p>
+            <a:pPr marL="0" indent="0">
+              <a:lnSpc>
+                <a:spcPts val="2850"/>
+              </a:lnSpc>
+              <a:buNone/>
+            </a:pPr>
+            <a:endParaRPr lang="en-US" sz="1750" dirty="0"/>
+          </a:p>
+        </p:txBody>
+      </p:sp>
+      <p:sp>
+        <p:nvSpPr>
+          <p:cNvPr id="39" name="Text 13">
+            <a:extLst>
+              <a:ext uri="{FF2B5EF4-FFF2-40B4-BE49-F238E27FC236}">
+                <a16:creationId xmlns:a16="http://schemas.microsoft.com/office/drawing/2014/main" id="{2FC9D2F8-7BF8-9A4A-0B46-699977730BDF}"/>
+              </a:ext>
+            </a:extLst>
+          </p:cNvPr>
+          <p:cNvSpPr/>
+          <p:nvPr/>
+        </p:nvSpPr>
+        <p:spPr>
+          <a:xfrm>
+            <a:off x="11045988" y="3921260"/>
+            <a:ext cx="3206921" cy="558066"/>
+          </a:xfrm>
+          <a:prstGeom prst="rect">
+            <a:avLst/>
+          </a:prstGeom>
+          <a:noFill/>
+          <a:ln/>
+        </p:spPr>
+        <p:txBody>
+          <a:bodyPr wrap="square" lIns="0" tIns="0" rIns="0" bIns="0" rtlCol="0" anchor="t"/>
+          <a:lstStyle/>
+          <a:p>
+            <a:pPr marL="0" indent="0">
+              <a:lnSpc>
+                <a:spcPts val="2850"/>
+              </a:lnSpc>
+              <a:buNone/>
+            </a:pPr>
+            <a:endParaRPr lang="en-US" sz="1750" dirty="0"/>
+          </a:p>
+        </p:txBody>
+      </p:sp>
+      <p:sp>
+        <p:nvSpPr>
+          <p:cNvPr id="40" name="Shape 14">
+            <a:extLst>
+              <a:ext uri="{FF2B5EF4-FFF2-40B4-BE49-F238E27FC236}">
+                <a16:creationId xmlns:a16="http://schemas.microsoft.com/office/drawing/2014/main" id="{2113E956-DB9C-145D-D1E2-669871680497}"/>
+              </a:ext>
+            </a:extLst>
+          </p:cNvPr>
+          <p:cNvSpPr/>
+          <p:nvPr/>
+        </p:nvSpPr>
+        <p:spPr>
+          <a:xfrm>
+            <a:off x="7175594" y="4777263"/>
+            <a:ext cx="7305199" cy="842494"/>
+          </a:xfrm>
+          <a:prstGeom prst="rect">
+            <a:avLst/>
+          </a:prstGeom>
+          <a:solidFill>
+            <a:srgbClr val="FFFFFF">
+              <a:alpha val="4000"/>
+            </a:srgbClr>
+          </a:solidFill>
+          <a:ln/>
+        </p:spPr>
+        <p:txBody>
+          <a:bodyPr/>
+          <a:lstStyle/>
+          <a:p>
+            <a:r>
+              <a:rPr lang="en-US" dirty="0" err="1">
+                <a:solidFill>
+                  <a:srgbClr val="D6E5EF"/>
+                </a:solidFill>
+                <a:latin typeface="Source Sans Pro" panose="020B0503030403020204" pitchFamily="34" charset="0"/>
+                <a:ea typeface="Source Sans Pro" panose="020B0503030403020204" pitchFamily="34" charset="0"/>
+              </a:rPr>
+              <a:t>Getaddrinfo</a:t>
+            </a:r>
+            <a:r>
+              <a:rPr lang="en-US" dirty="0">
+                <a:solidFill>
+                  <a:srgbClr val="D6E5EF"/>
+                </a:solidFill>
+                <a:latin typeface="Source Sans Pro" panose="020B0503030403020204" pitchFamily="34" charset="0"/>
+                <a:ea typeface="Source Sans Pro" panose="020B0503030403020204" pitchFamily="34" charset="0"/>
+              </a:rPr>
+              <a:t>()</a:t>
+            </a:r>
+          </a:p>
+        </p:txBody>
+      </p:sp>
+      <p:sp>
+        <p:nvSpPr>
+          <p:cNvPr id="41" name="Text 15">
+            <a:extLst>
+              <a:ext uri="{FF2B5EF4-FFF2-40B4-BE49-F238E27FC236}">
+                <a16:creationId xmlns:a16="http://schemas.microsoft.com/office/drawing/2014/main" id="{9B091544-6467-830C-F7D2-8D794120E9B7}"/>
+              </a:ext>
+            </a:extLst>
+          </p:cNvPr>
+          <p:cNvSpPr/>
+          <p:nvPr/>
+        </p:nvSpPr>
+        <p:spPr>
+          <a:xfrm>
+            <a:off x="7275635" y="4853708"/>
+            <a:ext cx="3206921" cy="279033"/>
+          </a:xfrm>
+          <a:prstGeom prst="rect">
+            <a:avLst/>
+          </a:prstGeom>
+          <a:noFill/>
+          <a:ln/>
+        </p:spPr>
+        <p:txBody>
+          <a:bodyPr wrap="none" lIns="0" tIns="0" rIns="0" bIns="0" rtlCol="0" anchor="t"/>
+          <a:lstStyle/>
+          <a:p>
+            <a:pPr marL="0" indent="0">
+              <a:lnSpc>
+                <a:spcPts val="2850"/>
+              </a:lnSpc>
+              <a:buNone/>
+            </a:pPr>
+            <a:endParaRPr lang="en-US" sz="1750" dirty="0"/>
+          </a:p>
+        </p:txBody>
+      </p:sp>
+      <p:sp>
+        <p:nvSpPr>
+          <p:cNvPr id="42" name="Text 16">
+            <a:extLst>
+              <a:ext uri="{FF2B5EF4-FFF2-40B4-BE49-F238E27FC236}">
+                <a16:creationId xmlns:a16="http://schemas.microsoft.com/office/drawing/2014/main" id="{932FE386-E12E-C355-75B1-DAB98672B3DC}"/>
+              </a:ext>
+            </a:extLst>
+          </p:cNvPr>
+          <p:cNvSpPr/>
+          <p:nvPr/>
+        </p:nvSpPr>
+        <p:spPr>
+          <a:xfrm>
+            <a:off x="11045988" y="4853708"/>
+            <a:ext cx="3206921" cy="279033"/>
+          </a:xfrm>
+          <a:prstGeom prst="rect">
+            <a:avLst/>
+          </a:prstGeom>
+          <a:noFill/>
+          <a:ln/>
+        </p:spPr>
+        <p:txBody>
+          <a:bodyPr wrap="none" lIns="0" tIns="0" rIns="0" bIns="0" rtlCol="0" anchor="t"/>
+          <a:lstStyle/>
+          <a:p>
+            <a:pPr marL="0" indent="0">
+              <a:lnSpc>
+                <a:spcPts val="2850"/>
+              </a:lnSpc>
+              <a:buNone/>
+            </a:pPr>
+            <a:endParaRPr lang="en-US" sz="1750" dirty="0"/>
+          </a:p>
+        </p:txBody>
+      </p:sp>
+      <p:sp>
+        <p:nvSpPr>
+          <p:cNvPr id="43" name="Shape 17">
+            <a:extLst>
+              <a:ext uri="{FF2B5EF4-FFF2-40B4-BE49-F238E27FC236}">
+                <a16:creationId xmlns:a16="http://schemas.microsoft.com/office/drawing/2014/main" id="{0464F8FF-616F-34E8-D559-2CCAAED01F96}"/>
+              </a:ext>
+            </a:extLst>
+          </p:cNvPr>
+          <p:cNvSpPr/>
+          <p:nvPr/>
+        </p:nvSpPr>
+        <p:spPr>
+          <a:xfrm>
+            <a:off x="7175594" y="5516453"/>
+            <a:ext cx="7305199" cy="778815"/>
+          </a:xfrm>
+          <a:prstGeom prst="rect">
+            <a:avLst/>
+          </a:prstGeom>
+          <a:solidFill>
+            <a:srgbClr val="000000">
+              <a:alpha val="4000"/>
+            </a:srgbClr>
+          </a:solidFill>
+          <a:ln/>
+        </p:spPr>
+      </p:sp>
+      <p:sp>
+        <p:nvSpPr>
+          <p:cNvPr id="44" name="Text 18">
+            <a:extLst>
+              <a:ext uri="{FF2B5EF4-FFF2-40B4-BE49-F238E27FC236}">
+                <a16:creationId xmlns:a16="http://schemas.microsoft.com/office/drawing/2014/main" id="{78D8D4DF-FC47-EABE-8812-571D8FCBCF9B}"/>
+              </a:ext>
+            </a:extLst>
+          </p:cNvPr>
+          <p:cNvSpPr/>
+          <p:nvPr/>
+        </p:nvSpPr>
+        <p:spPr>
+          <a:xfrm>
+            <a:off x="7267622" y="3144631"/>
+            <a:ext cx="3206921" cy="279033"/>
+          </a:xfrm>
+          <a:prstGeom prst="rect">
+            <a:avLst/>
+          </a:prstGeom>
+          <a:noFill/>
+          <a:ln/>
+        </p:spPr>
+        <p:txBody>
+          <a:bodyPr wrap="none" lIns="0" tIns="0" rIns="0" bIns="0" rtlCol="0" anchor="t"/>
+          <a:lstStyle/>
+          <a:p>
+            <a:pPr marL="0" indent="0">
+              <a:lnSpc>
+                <a:spcPts val="2850"/>
+              </a:lnSpc>
+              <a:buNone/>
+            </a:pPr>
+            <a:r>
+              <a:rPr lang="en-US" sz="1750" dirty="0">
+                <a:solidFill>
+                  <a:srgbClr val="D6E5EF"/>
+                </a:solidFill>
+                <a:latin typeface="Source Sans Pro" pitchFamily="34" charset="0"/>
+                <a:ea typeface="Source Sans Pro" pitchFamily="34" charset="-122"/>
+                <a:cs typeface="Source Sans Pro" pitchFamily="34" charset="-120"/>
+              </a:rPr>
+              <a:t>connect()</a:t>
+            </a:r>
+            <a:endParaRPr lang="en-US" sz="1750" dirty="0"/>
+          </a:p>
+        </p:txBody>
+      </p:sp>
+      <p:sp>
+        <p:nvSpPr>
+          <p:cNvPr id="45" name="Text 19">
+            <a:extLst>
+              <a:ext uri="{FF2B5EF4-FFF2-40B4-BE49-F238E27FC236}">
+                <a16:creationId xmlns:a16="http://schemas.microsoft.com/office/drawing/2014/main" id="{FBD98CFA-8759-FC62-E092-27AD0672EE87}"/>
+              </a:ext>
+            </a:extLst>
+          </p:cNvPr>
+          <p:cNvSpPr/>
+          <p:nvPr/>
+        </p:nvSpPr>
+        <p:spPr>
+          <a:xfrm>
+            <a:off x="10953521" y="3071913"/>
+            <a:ext cx="3206921" cy="558066"/>
+          </a:xfrm>
+          <a:prstGeom prst="rect">
+            <a:avLst/>
+          </a:prstGeom>
+          <a:noFill/>
+          <a:ln/>
+        </p:spPr>
+        <p:txBody>
+          <a:bodyPr wrap="square" lIns="0" tIns="0" rIns="0" bIns="0" rtlCol="0" anchor="t"/>
+          <a:lstStyle/>
+          <a:p>
+            <a:pPr marL="0" indent="0">
+              <a:lnSpc>
+                <a:spcPts val="2850"/>
+              </a:lnSpc>
+              <a:buNone/>
+            </a:pPr>
+            <a:r>
+              <a:rPr lang="en-US" sz="1750" dirty="0">
+                <a:solidFill>
+                  <a:schemeClr val="bg2"/>
+                </a:solidFill>
+                <a:latin typeface="Source Sans Pro" pitchFamily="34" charset="0"/>
+                <a:ea typeface="Source Sans Pro" pitchFamily="34" charset="-122"/>
+                <a:cs typeface="Source Sans Pro" pitchFamily="34" charset="-120"/>
+              </a:rPr>
+              <a:t>Establishes a connection to a server</a:t>
+            </a:r>
+            <a:endParaRPr lang="en-US" sz="1750" dirty="0">
+              <a:solidFill>
+                <a:schemeClr val="bg2"/>
+              </a:solidFill>
+            </a:endParaRPr>
+          </a:p>
+        </p:txBody>
+      </p:sp>
+      <p:sp>
+        <p:nvSpPr>
+          <p:cNvPr id="46" name="Shape 20">
+            <a:extLst>
+              <a:ext uri="{FF2B5EF4-FFF2-40B4-BE49-F238E27FC236}">
+                <a16:creationId xmlns:a16="http://schemas.microsoft.com/office/drawing/2014/main" id="{D7ADA0ED-E538-19D2-CA31-4F7D55BF26ED}"/>
+              </a:ext>
+            </a:extLst>
+          </p:cNvPr>
+          <p:cNvSpPr/>
+          <p:nvPr/>
+        </p:nvSpPr>
+        <p:spPr>
+          <a:xfrm>
+            <a:off x="7183214" y="6464141"/>
+            <a:ext cx="7305199" cy="499782"/>
+          </a:xfrm>
+          <a:prstGeom prst="rect">
+            <a:avLst/>
+          </a:prstGeom>
+          <a:solidFill>
+            <a:srgbClr val="FFFFFF">
+              <a:alpha val="4000"/>
+            </a:srgbClr>
+          </a:solidFill>
+          <a:ln/>
+        </p:spPr>
+      </p:sp>
+      <p:sp>
+        <p:nvSpPr>
+          <p:cNvPr id="47" name="Text 21">
+            <a:extLst>
+              <a:ext uri="{FF2B5EF4-FFF2-40B4-BE49-F238E27FC236}">
+                <a16:creationId xmlns:a16="http://schemas.microsoft.com/office/drawing/2014/main" id="{86418A21-99E8-4B1F-D316-D45DE1B109BB}"/>
+              </a:ext>
+            </a:extLst>
+          </p:cNvPr>
+          <p:cNvSpPr/>
+          <p:nvPr/>
+        </p:nvSpPr>
+        <p:spPr>
+          <a:xfrm>
+            <a:off x="7315200" y="3824068"/>
+            <a:ext cx="3206921" cy="279033"/>
+          </a:xfrm>
+          <a:prstGeom prst="rect">
+            <a:avLst/>
+          </a:prstGeom>
+          <a:noFill/>
+          <a:ln/>
+        </p:spPr>
+        <p:txBody>
+          <a:bodyPr wrap="none" lIns="0" tIns="0" rIns="0" bIns="0" rtlCol="0" anchor="t"/>
+          <a:lstStyle/>
+          <a:p>
+            <a:pPr marL="0" indent="0">
+              <a:lnSpc>
+                <a:spcPts val="2850"/>
+              </a:lnSpc>
+              <a:buNone/>
+            </a:pPr>
+            <a:r>
+              <a:rPr lang="en-US" sz="1750" dirty="0">
+                <a:solidFill>
+                  <a:srgbClr val="D6E5EF"/>
+                </a:solidFill>
+                <a:latin typeface="Source Sans Pro" pitchFamily="34" charset="0"/>
+                <a:ea typeface="Source Sans Pro" pitchFamily="34" charset="-122"/>
+                <a:cs typeface="Source Sans Pro" pitchFamily="34" charset="-120"/>
+              </a:rPr>
+              <a:t>select()</a:t>
+            </a:r>
+            <a:endParaRPr lang="en-US" sz="1750" dirty="0"/>
+          </a:p>
+        </p:txBody>
+      </p:sp>
+      <p:sp>
+        <p:nvSpPr>
+          <p:cNvPr id="48" name="Text 22">
+            <a:extLst>
+              <a:ext uri="{FF2B5EF4-FFF2-40B4-BE49-F238E27FC236}">
+                <a16:creationId xmlns:a16="http://schemas.microsoft.com/office/drawing/2014/main" id="{D513B611-506A-BDCD-8B12-1E975D6A9FD4}"/>
+              </a:ext>
+            </a:extLst>
+          </p:cNvPr>
+          <p:cNvSpPr/>
+          <p:nvPr/>
+        </p:nvSpPr>
+        <p:spPr>
+          <a:xfrm>
+            <a:off x="10953520" y="3928880"/>
+            <a:ext cx="3206921" cy="279033"/>
+          </a:xfrm>
+          <a:prstGeom prst="rect">
+            <a:avLst/>
+          </a:prstGeom>
+          <a:noFill/>
+          <a:ln/>
+        </p:spPr>
+        <p:txBody>
+          <a:bodyPr wrap="none" lIns="0" tIns="0" rIns="0" bIns="0" rtlCol="0" anchor="t"/>
+          <a:lstStyle/>
+          <a:p>
+            <a:pPr marL="0" indent="0">
+              <a:lnSpc>
+                <a:spcPts val="2850"/>
+              </a:lnSpc>
+              <a:buNone/>
+            </a:pPr>
+            <a:r>
+              <a:rPr lang="en-US" sz="1750" dirty="0">
+                <a:solidFill>
+                  <a:schemeClr val="bg2"/>
+                </a:solidFill>
+                <a:latin typeface="Source Sans Pro" panose="020B0503030403020204" pitchFamily="34" charset="0"/>
+                <a:ea typeface="Source Sans Pro" panose="020B0503030403020204" pitchFamily="34" charset="0"/>
+              </a:rPr>
+              <a:t>Can be used, not usually not</a:t>
+            </a:r>
+          </a:p>
+        </p:txBody>
+      </p:sp>
+      <p:sp>
+        <p:nvSpPr>
+          <p:cNvPr id="49" name="Text 24">
+            <a:extLst>
+              <a:ext uri="{FF2B5EF4-FFF2-40B4-BE49-F238E27FC236}">
+                <a16:creationId xmlns:a16="http://schemas.microsoft.com/office/drawing/2014/main" id="{1A9CDCE4-17CD-BF15-1591-FC476C446616}"/>
+              </a:ext>
+            </a:extLst>
+          </p:cNvPr>
+          <p:cNvSpPr/>
+          <p:nvPr/>
+        </p:nvSpPr>
+        <p:spPr>
+          <a:xfrm>
+            <a:off x="7275635" y="7178760"/>
+            <a:ext cx="3206921" cy="279033"/>
+          </a:xfrm>
+          <a:prstGeom prst="rect">
+            <a:avLst/>
+          </a:prstGeom>
+          <a:noFill/>
+          <a:ln/>
+        </p:spPr>
+        <p:txBody>
+          <a:bodyPr wrap="none" lIns="0" tIns="0" rIns="0" bIns="0" rtlCol="0" anchor="t"/>
+          <a:lstStyle/>
+          <a:p>
+            <a:pPr marL="0" indent="0">
+              <a:lnSpc>
+                <a:spcPts val="2850"/>
+              </a:lnSpc>
+              <a:buNone/>
+            </a:pPr>
+            <a:endParaRPr lang="en-US" sz="1750" dirty="0"/>
+          </a:p>
+        </p:txBody>
+      </p:sp>
+      <p:sp>
+        <p:nvSpPr>
+          <p:cNvPr id="50" name="Text 25">
+            <a:extLst>
+              <a:ext uri="{FF2B5EF4-FFF2-40B4-BE49-F238E27FC236}">
+                <a16:creationId xmlns:a16="http://schemas.microsoft.com/office/drawing/2014/main" id="{4975C38D-EC3B-B677-3A27-598A929E52DF}"/>
+              </a:ext>
+            </a:extLst>
+          </p:cNvPr>
+          <p:cNvSpPr/>
+          <p:nvPr/>
+        </p:nvSpPr>
+        <p:spPr>
+          <a:xfrm>
+            <a:off x="11117907" y="7210048"/>
+            <a:ext cx="3206921" cy="279033"/>
+          </a:xfrm>
+          <a:prstGeom prst="rect">
+            <a:avLst/>
+          </a:prstGeom>
+          <a:noFill/>
+          <a:ln/>
+        </p:spPr>
+        <p:txBody>
+          <a:bodyPr wrap="none" lIns="0" tIns="0" rIns="0" bIns="0" rtlCol="0" anchor="t"/>
+          <a:lstStyle/>
+          <a:p>
+            <a:pPr marL="0" indent="0">
+              <a:lnSpc>
+                <a:spcPts val="2850"/>
+              </a:lnSpc>
+              <a:buNone/>
+            </a:pPr>
+            <a:endParaRPr lang="en-US" sz="1750" dirty="0"/>
+          </a:p>
+        </p:txBody>
+      </p:sp>
+      <p:sp>
+        <p:nvSpPr>
+          <p:cNvPr id="99" name="Text 22">
+            <a:extLst>
+              <a:ext uri="{FF2B5EF4-FFF2-40B4-BE49-F238E27FC236}">
+                <a16:creationId xmlns:a16="http://schemas.microsoft.com/office/drawing/2014/main" id="{F7601BD9-70E6-C5B1-157A-404BB227BABB}"/>
+              </a:ext>
+            </a:extLst>
+          </p:cNvPr>
+          <p:cNvSpPr/>
+          <p:nvPr/>
+        </p:nvSpPr>
+        <p:spPr>
+          <a:xfrm>
+            <a:off x="10953519" y="4801068"/>
+            <a:ext cx="3206921" cy="279033"/>
+          </a:xfrm>
+          <a:prstGeom prst="rect">
+            <a:avLst/>
+          </a:prstGeom>
+          <a:noFill/>
+          <a:ln/>
+        </p:spPr>
+        <p:txBody>
+          <a:bodyPr wrap="none" lIns="0" tIns="0" rIns="0" bIns="0" rtlCol="0" anchor="t"/>
+          <a:lstStyle/>
+          <a:p>
+            <a:pPr marL="0" indent="0">
+              <a:lnSpc>
+                <a:spcPts val="2850"/>
+              </a:lnSpc>
+              <a:buNone/>
+            </a:pPr>
+            <a:r>
+              <a:rPr lang="en-US" sz="1750" dirty="0">
+                <a:solidFill>
+                  <a:schemeClr val="bg2"/>
+                </a:solidFill>
+                <a:latin typeface="Source Sans Pro" panose="020B0503030403020204" pitchFamily="34" charset="0"/>
+                <a:ea typeface="Source Sans Pro" panose="020B0503030403020204" pitchFamily="34" charset="0"/>
+              </a:rPr>
+              <a:t>Given a port and </a:t>
+            </a:r>
+            <a:r>
+              <a:rPr lang="en-US" sz="1750" dirty="0" err="1">
+                <a:solidFill>
+                  <a:schemeClr val="bg2"/>
+                </a:solidFill>
+                <a:latin typeface="Source Sans Pro" panose="020B0503030403020204" pitchFamily="34" charset="0"/>
+                <a:ea typeface="Source Sans Pro" panose="020B0503030403020204" pitchFamily="34" charset="0"/>
+              </a:rPr>
+              <a:t>ip</a:t>
+            </a:r>
+            <a:r>
+              <a:rPr lang="en-US" sz="1750" dirty="0">
+                <a:solidFill>
+                  <a:schemeClr val="bg2"/>
+                </a:solidFill>
+                <a:latin typeface="Source Sans Pro" panose="020B0503030403020204" pitchFamily="34" charset="0"/>
+                <a:ea typeface="Source Sans Pro" panose="020B0503030403020204" pitchFamily="34" charset="0"/>
+              </a:rPr>
+              <a:t>, get the </a:t>
+            </a:r>
+            <a:r>
+              <a:rPr lang="en-US" sz="1750" dirty="0" err="1">
+                <a:solidFill>
+                  <a:schemeClr val="bg2"/>
+                </a:solidFill>
+                <a:latin typeface="Source Sans Pro" panose="020B0503030403020204" pitchFamily="34" charset="0"/>
+                <a:ea typeface="Source Sans Pro" panose="020B0503030403020204" pitchFamily="34" charset="0"/>
+              </a:rPr>
+              <a:t>necc</a:t>
+            </a:r>
+            <a:endParaRPr lang="en-US" sz="1750" dirty="0">
+              <a:solidFill>
+                <a:schemeClr val="bg2"/>
+              </a:solidFill>
+              <a:latin typeface="Source Sans Pro" panose="020B0503030403020204" pitchFamily="34" charset="0"/>
+              <a:ea typeface="Source Sans Pro" panose="020B0503030403020204" pitchFamily="34" charset="0"/>
+            </a:endParaRPr>
+          </a:p>
+          <a:p>
+            <a:pPr marL="0" indent="0">
+              <a:lnSpc>
+                <a:spcPts val="2850"/>
+              </a:lnSpc>
+              <a:buNone/>
+            </a:pPr>
+            <a:r>
+              <a:rPr lang="en-US" sz="1750" dirty="0">
+                <a:solidFill>
+                  <a:schemeClr val="bg2"/>
+                </a:solidFill>
+                <a:latin typeface="Source Sans Pro" panose="020B0503030403020204" pitchFamily="34" charset="0"/>
+                <a:ea typeface="Source Sans Pro" panose="020B0503030403020204" pitchFamily="34" charset="0"/>
+              </a:rPr>
+              <a:t>Info to connect (linked list of options)</a:t>
+            </a:r>
           </a:p>
         </p:txBody>
       </p:sp>
@@ -19545,7 +20583,7 @@
                 <a:ea typeface="Source Sans Pro" pitchFamily="34" charset="-122"/>
                 <a:cs typeface="Source Sans Pro" pitchFamily="34" charset="-120"/>
               </a:rPr>
-              <a:t>Bind() – we use this ONLY on the client</a:t>
+              <a:t>Bind() – we use this ONLY on the server</a:t>
             </a:r>
             <a:endParaRPr lang="en-US" sz="1750" dirty="0"/>
           </a:p>

</xml_diff>